<commit_message>
Add Thread, Runnable, lambda practicing
</commit_message>
<xml_diff>
--- a/study-note/자바/2022-08-25 내용정리.pptx
+++ b/study-note/자바/2022-08-25 내용정리.pptx
@@ -4415,15 +4415,13 @@
           </a:prstGeom>
         </p:spPr>
         <p:style>
-          <a:lnRef idx="2">
-            <a:schemeClr val="accent1">
-              <a:shade val="50000"/>
-            </a:schemeClr>
+          <a:lnRef idx="3">
+            <a:schemeClr val="lt1"/>
           </a:lnRef>
           <a:fillRef idx="1">
             <a:schemeClr val="accent1"/>
           </a:fillRef>
-          <a:effectRef idx="0">
+          <a:effectRef idx="1">
             <a:schemeClr val="accent1"/>
           </a:effectRef>
           <a:fontRef idx="minor">
@@ -4577,6 +4575,56 @@
           </a:fontRef>
         </p:style>
       </p:cxnSp>
+      <p:sp>
+        <p:nvSpPr>
+          <p:cNvPr id="7" name="TextBox 6">
+            <a:extLst>
+              <a:ext uri="{FF2B5EF4-FFF2-40B4-BE49-F238E27FC236}">
+                <a16:creationId xmlns:a16="http://schemas.microsoft.com/office/drawing/2014/main" id="{B3CDD204-BBA5-A5A8-39B4-8DD85C64F5B9}"/>
+              </a:ext>
+            </a:extLst>
+          </p:cNvPr>
+          <p:cNvSpPr txBox="1"/>
+          <p:nvPr/>
+        </p:nvSpPr>
+        <p:spPr>
+          <a:xfrm>
+            <a:off x="4073070" y="2461161"/>
+            <a:ext cx="663734" cy="276999"/>
+          </a:xfrm>
+          <a:prstGeom prst="rect">
+            <a:avLst/>
+          </a:prstGeom>
+        </p:spPr>
+        <p:style>
+          <a:lnRef idx="2">
+            <a:schemeClr val="dk1"/>
+          </a:lnRef>
+          <a:fillRef idx="1">
+            <a:schemeClr val="lt1"/>
+          </a:fillRef>
+          <a:effectRef idx="0">
+            <a:schemeClr val="dk1"/>
+          </a:effectRef>
+          <a:fontRef idx="minor">
+            <a:schemeClr val="dk1"/>
+          </a:fontRef>
+        </p:style>
+        <p:txBody>
+          <a:bodyPr wrap="square" rtlCol="0">
+            <a:spAutoFit/>
+          </a:bodyPr>
+          <a:lstStyle/>
+          <a:p>
+            <a:pPr algn="ctr"/>
+            <a:r>
+              <a:rPr kumimoji="1" lang="ko-KR" altLang="en-US" sz="1200" dirty="0"/>
+              <a:t>상속</a:t>
+            </a:r>
+            <a:endParaRPr kumimoji="1" lang="ko-Kore-KR" altLang="en-US" sz="1200" dirty="0"/>
+          </a:p>
+        </p:txBody>
+      </p:sp>
     </p:spTree>
     <p:extLst>
       <p:ext uri="{BB962C8B-B14F-4D97-AF65-F5344CB8AC3E}">
@@ -4607,6 +4655,261 @@
           <a:chExt cx="0" cy="0"/>
         </a:xfrm>
       </p:grpSpPr>
+      <p:sp>
+        <p:nvSpPr>
+          <p:cNvPr id="2" name="직사각형 1">
+            <a:extLst>
+              <a:ext uri="{FF2B5EF4-FFF2-40B4-BE49-F238E27FC236}">
+                <a16:creationId xmlns:a16="http://schemas.microsoft.com/office/drawing/2014/main" id="{7E6164ED-84AE-8A53-3C41-D93E8FA91F65}"/>
+              </a:ext>
+            </a:extLst>
+          </p:cNvPr>
+          <p:cNvSpPr/>
+          <p:nvPr/>
+        </p:nvSpPr>
+        <p:spPr>
+          <a:xfrm>
+            <a:off x="1052623" y="1392864"/>
+            <a:ext cx="5869172" cy="4774019"/>
+          </a:xfrm>
+          <a:prstGeom prst="rect">
+            <a:avLst/>
+          </a:prstGeom>
+        </p:spPr>
+        <p:style>
+          <a:lnRef idx="3">
+            <a:schemeClr val="lt1"/>
+          </a:lnRef>
+          <a:fillRef idx="1">
+            <a:schemeClr val="accent1"/>
+          </a:fillRef>
+          <a:effectRef idx="1">
+            <a:schemeClr val="accent1"/>
+          </a:effectRef>
+          <a:fontRef idx="minor">
+            <a:schemeClr val="lt1"/>
+          </a:fontRef>
+        </p:style>
+        <p:txBody>
+          <a:bodyPr rtlCol="0" anchor="t"/>
+          <a:lstStyle/>
+          <a:p>
+            <a:r>
+              <a:rPr kumimoji="1" lang="en-US" altLang="ko-Kore-KR" dirty="0"/>
+              <a:t>while()</a:t>
+            </a:r>
+            <a:endParaRPr kumimoji="1" lang="ko-Kore-KR" altLang="en-US" dirty="0"/>
+          </a:p>
+        </p:txBody>
+      </p:sp>
+      <p:sp>
+        <p:nvSpPr>
+          <p:cNvPr id="6" name="직사각형 5">
+            <a:extLst>
+              <a:ext uri="{FF2B5EF4-FFF2-40B4-BE49-F238E27FC236}">
+                <a16:creationId xmlns:a16="http://schemas.microsoft.com/office/drawing/2014/main" id="{A1F27E04-8B9F-26D8-F20D-4E4715D53822}"/>
+              </a:ext>
+            </a:extLst>
+          </p:cNvPr>
+          <p:cNvSpPr/>
+          <p:nvPr/>
+        </p:nvSpPr>
+        <p:spPr>
+          <a:xfrm>
+            <a:off x="1201479" y="1881963"/>
+            <a:ext cx="5475767" cy="4040372"/>
+          </a:xfrm>
+          <a:prstGeom prst="rect">
+            <a:avLst/>
+          </a:prstGeom>
+        </p:spPr>
+        <p:style>
+          <a:lnRef idx="3">
+            <a:schemeClr val="lt1"/>
+          </a:lnRef>
+          <a:fillRef idx="1">
+            <a:schemeClr val="accent3"/>
+          </a:fillRef>
+          <a:effectRef idx="1">
+            <a:schemeClr val="accent3"/>
+          </a:effectRef>
+          <a:fontRef idx="minor">
+            <a:schemeClr val="lt1"/>
+          </a:fontRef>
+        </p:style>
+        <p:txBody>
+          <a:bodyPr rtlCol="0" anchor="t"/>
+          <a:lstStyle/>
+          <a:p>
+            <a:r>
+              <a:rPr kumimoji="1" lang="en-US" altLang="ko-Kore-KR" dirty="0"/>
+              <a:t>Thread()</a:t>
+            </a:r>
+            <a:endParaRPr kumimoji="1" lang="ko-Kore-KR" altLang="en-US" dirty="0"/>
+          </a:p>
+        </p:txBody>
+      </p:sp>
+      <p:sp>
+        <p:nvSpPr>
+          <p:cNvPr id="3" name="직사각형 2">
+            <a:extLst>
+              <a:ext uri="{FF2B5EF4-FFF2-40B4-BE49-F238E27FC236}">
+                <a16:creationId xmlns:a16="http://schemas.microsoft.com/office/drawing/2014/main" id="{3075957E-1146-AD74-C704-8CDC3918DB20}"/>
+              </a:ext>
+            </a:extLst>
+          </p:cNvPr>
+          <p:cNvSpPr/>
+          <p:nvPr/>
+        </p:nvSpPr>
+        <p:spPr>
+          <a:xfrm>
+            <a:off x="1329070" y="2753832"/>
+            <a:ext cx="4671235" cy="2892055"/>
+          </a:xfrm>
+          <a:prstGeom prst="rect">
+            <a:avLst/>
+          </a:prstGeom>
+        </p:spPr>
+        <p:style>
+          <a:lnRef idx="3">
+            <a:schemeClr val="lt1"/>
+          </a:lnRef>
+          <a:fillRef idx="1">
+            <a:schemeClr val="accent5"/>
+          </a:fillRef>
+          <a:effectRef idx="1">
+            <a:schemeClr val="accent5"/>
+          </a:effectRef>
+          <a:fontRef idx="minor">
+            <a:schemeClr val="lt1"/>
+          </a:fontRef>
+        </p:style>
+        <p:txBody>
+          <a:bodyPr rtlCol="0" anchor="t"/>
+          <a:lstStyle/>
+          <a:p>
+            <a:r>
+              <a:rPr kumimoji="1" lang="en-US" altLang="ko-Kore-KR" dirty="0"/>
+              <a:t>run()</a:t>
+            </a:r>
+            <a:endParaRPr kumimoji="1" lang="ko-Kore-KR" altLang="en-US" dirty="0"/>
+          </a:p>
+        </p:txBody>
+      </p:sp>
+      <p:sp>
+        <p:nvSpPr>
+          <p:cNvPr id="4" name="TextBox 3">
+            <a:extLst>
+              <a:ext uri="{FF2B5EF4-FFF2-40B4-BE49-F238E27FC236}">
+                <a16:creationId xmlns:a16="http://schemas.microsoft.com/office/drawing/2014/main" id="{97978D51-8917-47DE-62D8-9934A0D68983}"/>
+              </a:ext>
+            </a:extLst>
+          </p:cNvPr>
+          <p:cNvSpPr txBox="1"/>
+          <p:nvPr/>
+        </p:nvSpPr>
+        <p:spPr>
+          <a:xfrm>
+            <a:off x="1329070" y="2305451"/>
+            <a:ext cx="4167963" cy="338554"/>
+          </a:xfrm>
+          <a:prstGeom prst="rect">
+            <a:avLst/>
+          </a:prstGeom>
+        </p:spPr>
+        <p:style>
+          <a:lnRef idx="2">
+            <a:schemeClr val="dk1"/>
+          </a:lnRef>
+          <a:fillRef idx="1">
+            <a:schemeClr val="lt1"/>
+          </a:fillRef>
+          <a:effectRef idx="0">
+            <a:schemeClr val="dk1"/>
+          </a:effectRef>
+          <a:fontRef idx="minor">
+            <a:schemeClr val="dk1"/>
+          </a:fontRef>
+        </p:style>
+        <p:txBody>
+          <a:bodyPr wrap="square" rtlCol="0">
+            <a:spAutoFit/>
+          </a:bodyPr>
+          <a:lstStyle/>
+          <a:p>
+            <a:r>
+              <a:rPr kumimoji="1" lang="en-US" altLang="ko-Kore-KR" sz="1600" dirty="0"/>
+              <a:t>Socket socket = </a:t>
+            </a:r>
+            <a:r>
+              <a:rPr kumimoji="1" lang="en-US" altLang="ko-Kore-KR" sz="1600" dirty="0" err="1"/>
+              <a:t>serverSocket.accept</a:t>
+            </a:r>
+            <a:r>
+              <a:rPr kumimoji="1" lang="en-US" altLang="ko-Kore-KR" sz="1600" dirty="0"/>
+              <a:t>();</a:t>
+            </a:r>
+            <a:endParaRPr kumimoji="1" lang="ko-Kore-KR" altLang="en-US" sz="1600" dirty="0"/>
+          </a:p>
+        </p:txBody>
+      </p:sp>
+      <p:sp>
+        <p:nvSpPr>
+          <p:cNvPr id="5" name="TextBox 4">
+            <a:extLst>
+              <a:ext uri="{FF2B5EF4-FFF2-40B4-BE49-F238E27FC236}">
+                <a16:creationId xmlns:a16="http://schemas.microsoft.com/office/drawing/2014/main" id="{7D417EE2-E5CA-1BE0-0625-68B277FB7DF8}"/>
+              </a:ext>
+            </a:extLst>
+          </p:cNvPr>
+          <p:cNvSpPr txBox="1"/>
+          <p:nvPr/>
+        </p:nvSpPr>
+        <p:spPr>
+          <a:xfrm>
+            <a:off x="1417675" y="3297781"/>
+            <a:ext cx="4167963" cy="338554"/>
+          </a:xfrm>
+          <a:prstGeom prst="rect">
+            <a:avLst/>
+          </a:prstGeom>
+        </p:spPr>
+        <p:style>
+          <a:lnRef idx="2">
+            <a:schemeClr val="dk1"/>
+          </a:lnRef>
+          <a:fillRef idx="1">
+            <a:schemeClr val="lt1"/>
+          </a:fillRef>
+          <a:effectRef idx="0">
+            <a:schemeClr val="dk1"/>
+          </a:effectRef>
+          <a:fontRef idx="minor">
+            <a:schemeClr val="dk1"/>
+          </a:fontRef>
+        </p:style>
+        <p:txBody>
+          <a:bodyPr wrap="square" rtlCol="0">
+            <a:spAutoFit/>
+          </a:bodyPr>
+          <a:lstStyle/>
+          <a:p>
+            <a:r>
+              <a:rPr kumimoji="1" lang="en-US" altLang="ko-Kore-KR" sz="1600" dirty="0"/>
+              <a:t>socket = </a:t>
+            </a:r>
+            <a:r>
+              <a:rPr kumimoji="1" lang="en-US" altLang="ko-Kore-KR" sz="1600" dirty="0" err="1"/>
+              <a:t>this.socket</a:t>
+            </a:r>
+            <a:r>
+              <a:rPr kumimoji="1" lang="en-US" altLang="ko-Kore-KR" sz="1600" dirty="0"/>
+              <a:t>;</a:t>
+            </a:r>
+            <a:endParaRPr kumimoji="1" lang="ko-Kore-KR" altLang="en-US" sz="1600" dirty="0"/>
+          </a:p>
+        </p:txBody>
+      </p:sp>
     </p:spTree>
     <p:extLst>
       <p:ext uri="{BB962C8B-B14F-4D97-AF65-F5344CB8AC3E}">

</xml_diff>